<commit_message>
poster changes + plot changes
</commit_message>
<xml_diff>
--- a/Poster/ML_poster_rev2.pptx
+++ b/Poster/ML_poster_rev2.pptx
@@ -257,7 +257,7 @@
               <a:pPr>
                 <a:defRPr/>
               </a:pPr>
-              <a:t>3/3/2018</a:t>
+              <a:t>3/4/2018</a:t>
             </a:fld>
             <a:endParaRPr lang="en-US" altLang="en-US"/>
           </a:p>
@@ -626,7 +626,7 @@
               </a14:hiddenFill>
             </a:ext>
             <a:ext uri="{FAA26D3D-D897-4be2-8F04-BA451C77F1D7}">
-              <ma14:placeholderFlag xmlns="" xmlns:ma14="http://schemas.microsoft.com/office/mac/drawingml/2011/main" val="1"/>
+              <ma14:placeholderFlag xmlns:ma14="http://schemas.microsoft.com/office/mac/drawingml/2011/main" xmlns="" val="1"/>
             </a:ext>
           </a:extLst>
         </p:spPr>
@@ -662,7 +662,7 @@
               </a14:hiddenLine>
             </a:ext>
             <a:ext uri="{FAA26D3D-D897-4be2-8F04-BA451C77F1D7}">
-              <ma14:placeholderFlag xmlns="" xmlns:ma14="http://schemas.microsoft.com/office/mac/drawingml/2011/main" val="1"/>
+              <ma14:placeholderFlag xmlns:ma14="http://schemas.microsoft.com/office/mac/drawingml/2011/main" xmlns="" val="1"/>
             </a:ext>
           </a:extLst>
         </p:spPr>
@@ -3549,7 +3549,7 @@
               </a14:hiddenLine>
             </a:ext>
             <a:ext uri="{FAA26D3D-D897-4be2-8F04-BA451C77F1D7}">
-              <ma14:placeholderFlag xmlns="" xmlns:ma14="http://schemas.microsoft.com/office/mac/drawingml/2011/main" val="1"/>
+              <ma14:placeholderFlag xmlns:ma14="http://schemas.microsoft.com/office/mac/drawingml/2011/main" xmlns="" val="1"/>
             </a:ext>
           </a:extLst>
         </p:spPr>
@@ -3610,7 +3610,7 @@
               </a14:hiddenLine>
             </a:ext>
             <a:ext uri="{FAA26D3D-D897-4be2-8F04-BA451C77F1D7}">
-              <ma14:placeholderFlag xmlns="" xmlns:ma14="http://schemas.microsoft.com/office/mac/drawingml/2011/main" val="1"/>
+              <ma14:placeholderFlag xmlns:ma14="http://schemas.microsoft.com/office/mac/drawingml/2011/main" xmlns="" val="1"/>
             </a:ext>
           </a:extLst>
         </p:spPr>
@@ -5399,7 +5399,7 @@
               <a:buNone/>
             </a:pPr>
             <a:r>
-              <a:rPr lang="en-US" altLang="en-US" sz="5400" b="1" dirty="0">
+              <a:rPr lang="en-US" altLang="en-US" sz="5400" b="1" dirty="0" smtClean="0">
                 <a:solidFill>
                   <a:schemeClr val="bg1"/>
                 </a:solidFill>
@@ -5407,8 +5407,16 @@
                 <a:ea typeface="Times New Roman" charset="0"/>
                 <a:cs typeface="Times New Roman" charset="0"/>
               </a:rPr>
-              <a:t>Abstract / Background</a:t>
-            </a:r>
+              <a:t>Research Question</a:t>
+            </a:r>
+            <a:endParaRPr lang="en-US" altLang="en-US" sz="5400" b="1" dirty="0">
+              <a:solidFill>
+                <a:schemeClr val="bg1"/>
+              </a:solidFill>
+              <a:latin typeface="Times New Roman" charset="0"/>
+              <a:ea typeface="Times New Roman" charset="0"/>
+              <a:cs typeface="Times New Roman" charset="0"/>
+            </a:endParaRPr>
           </a:p>
         </p:txBody>
       </p:sp>
@@ -7517,7 +7525,7 @@
               <a:buNone/>
             </a:pPr>
             <a:r>
-              <a:rPr lang="en-US" altLang="en-US" sz="5400" b="1" dirty="0">
+              <a:rPr lang="en-US" altLang="en-US" sz="5400" b="1" dirty="0" smtClean="0">
                 <a:solidFill>
                   <a:schemeClr val="bg1"/>
                 </a:solidFill>
@@ -7525,8 +7533,16 @@
                 <a:ea typeface="Times New Roman" charset="0"/>
                 <a:cs typeface="Times New Roman" charset="0"/>
               </a:rPr>
-              <a:t>Contribution/Conclusions</a:t>
-            </a:r>
+              <a:t>Conclusion</a:t>
+            </a:r>
+            <a:endParaRPr lang="en-US" altLang="en-US" sz="5400" b="1" dirty="0">
+              <a:solidFill>
+                <a:schemeClr val="bg1"/>
+              </a:solidFill>
+              <a:latin typeface="Times New Roman" charset="0"/>
+              <a:ea typeface="Times New Roman" charset="0"/>
+              <a:cs typeface="Times New Roman" charset="0"/>
+            </a:endParaRPr>
           </a:p>
         </p:txBody>
       </p:sp>
@@ -8760,66 +8776,6 @@
           </a:p>
         </p:txBody>
       </p:sp>
-      <p:pic>
-        <p:nvPicPr>
-          <p:cNvPr id="14" name="그림 13"/>
-          <p:cNvPicPr>
-            <a:picLocks/>
-          </p:cNvPicPr>
-          <p:nvPr/>
-        </p:nvPicPr>
-        <p:blipFill>
-          <a:blip r:embed="rId5">
-            <a:extLst>
-              <a:ext uri="{28A0092B-C50C-407E-A947-70E740481C1C}">
-                <a14:useLocalDpi xmlns:a14="http://schemas.microsoft.com/office/drawing/2010/main" val="0"/>
-              </a:ext>
-            </a:extLst>
-          </a:blip>
-          <a:stretch>
-            <a:fillRect/>
-          </a:stretch>
-        </p:blipFill>
-        <p:spPr>
-          <a:xfrm>
-            <a:off x="22677120" y="6934200"/>
-            <a:ext cx="10241280" cy="5486400"/>
-          </a:xfrm>
-          <a:prstGeom prst="rect">
-            <a:avLst/>
-          </a:prstGeom>
-        </p:spPr>
-      </p:pic>
-      <p:pic>
-        <p:nvPicPr>
-          <p:cNvPr id="15" name="그림 14"/>
-          <p:cNvPicPr>
-            <a:picLocks/>
-          </p:cNvPicPr>
-          <p:nvPr/>
-        </p:nvPicPr>
-        <p:blipFill>
-          <a:blip r:embed="rId6">
-            <a:extLst>
-              <a:ext uri="{28A0092B-C50C-407E-A947-70E740481C1C}">
-                <a14:useLocalDpi xmlns:a14="http://schemas.microsoft.com/office/drawing/2010/main" val="0"/>
-              </a:ext>
-            </a:extLst>
-          </a:blip>
-          <a:stretch>
-            <a:fillRect/>
-          </a:stretch>
-        </p:blipFill>
-        <p:spPr>
-          <a:xfrm>
-            <a:off x="22677120" y="13197840"/>
-            <a:ext cx="10241280" cy="5394960"/>
-          </a:xfrm>
-          <a:prstGeom prst="rect">
-            <a:avLst/>
-          </a:prstGeom>
-        </p:spPr>
-      </p:pic>
       <p:sp>
         <p:nvSpPr>
           <p:cNvPr id="17" name="TextBox 16"/>
@@ -9280,7 +9236,7 @@
           <p:nvPr/>
         </p:nvPicPr>
         <p:blipFill>
-          <a:blip r:embed="rId7" cstate="print">
+          <a:blip r:embed="rId5" cstate="print">
             <a:extLst>
               <a:ext uri="{28A0092B-C50C-407E-A947-70E740481C1C}">
                 <a14:useLocalDpi xmlns:a14="http://schemas.microsoft.com/office/drawing/2010/main" val="0"/>
@@ -9310,7 +9266,7 @@
           <p:nvPr/>
         </p:nvPicPr>
         <p:blipFill>
-          <a:blip r:embed="rId8" cstate="print">
+          <a:blip r:embed="rId6" cstate="print">
             <a:extLst>
               <a:ext uri="{28A0092B-C50C-407E-A947-70E740481C1C}">
                 <a14:useLocalDpi xmlns:a14="http://schemas.microsoft.com/office/drawing/2010/main" val="0"/>
@@ -9340,7 +9296,7 @@
           <p:nvPr/>
         </p:nvPicPr>
         <p:blipFill>
-          <a:blip r:embed="rId9" cstate="print">
+          <a:blip r:embed="rId7" cstate="print">
             <a:extLst>
               <a:ext uri="{28A0092B-C50C-407E-A947-70E740481C1C}">
                 <a14:useLocalDpi xmlns:a14="http://schemas.microsoft.com/office/drawing/2010/main" val="0"/>
@@ -9370,7 +9326,7 @@
           <p:nvPr/>
         </p:nvPicPr>
         <p:blipFill>
-          <a:blip r:embed="rId10" cstate="print">
+          <a:blip r:embed="rId8" cstate="print">
             <a:extLst>
               <a:ext uri="{28A0092B-C50C-407E-A947-70E740481C1C}">
                 <a14:useLocalDpi xmlns:a14="http://schemas.microsoft.com/office/drawing/2010/main" val="0"/>
@@ -10008,7 +9964,7 @@
           <p:nvPr/>
         </p:nvPicPr>
         <p:blipFill>
-          <a:blip r:embed="rId11" cstate="print">
+          <a:blip r:embed="rId9" cstate="print">
             <a:extLst>
               <a:ext uri="{28A0092B-C50C-407E-A947-70E740481C1C}">
                 <a14:useLocalDpi xmlns:a14="http://schemas.microsoft.com/office/drawing/2010/main" val="0"/>
@@ -10021,8 +9977,8 @@
         </p:blipFill>
         <p:spPr>
           <a:xfrm>
-            <a:off x="11937846" y="14223473"/>
-            <a:ext cx="10058400" cy="5747657"/>
+            <a:off x="11937846" y="13998853"/>
+            <a:ext cx="10058400" cy="5972278"/>
           </a:xfrm>
           <a:prstGeom prst="rect">
             <a:avLst/>
@@ -10236,6 +10192,66 @@
           </a:p>
         </p:txBody>
       </p:sp>
+      <p:pic>
+        <p:nvPicPr>
+          <p:cNvPr id="5" name="그림 4"/>
+          <p:cNvPicPr>
+            <a:picLocks noChangeAspect="1"/>
+          </p:cNvPicPr>
+          <p:nvPr/>
+        </p:nvPicPr>
+        <p:blipFill>
+          <a:blip r:embed="rId10">
+            <a:extLst>
+              <a:ext uri="{28A0092B-C50C-407E-A947-70E740481C1C}">
+                <a14:useLocalDpi xmlns:a14="http://schemas.microsoft.com/office/drawing/2010/main" val="0"/>
+              </a:ext>
+            </a:extLst>
+          </a:blip>
+          <a:stretch>
+            <a:fillRect/>
+          </a:stretch>
+        </p:blipFill>
+        <p:spPr>
+          <a:xfrm>
+            <a:off x="22782466" y="7052130"/>
+            <a:ext cx="10104289" cy="5052145"/>
+          </a:xfrm>
+          <a:prstGeom prst="rect">
+            <a:avLst/>
+          </a:prstGeom>
+        </p:spPr>
+      </p:pic>
+      <p:pic>
+        <p:nvPicPr>
+          <p:cNvPr id="6" name="그림 5"/>
+          <p:cNvPicPr>
+            <a:picLocks noChangeAspect="1"/>
+          </p:cNvPicPr>
+          <p:nvPr/>
+        </p:nvPicPr>
+        <p:blipFill>
+          <a:blip r:embed="rId11">
+            <a:extLst>
+              <a:ext uri="{28A0092B-C50C-407E-A947-70E740481C1C}">
+                <a14:useLocalDpi xmlns:a14="http://schemas.microsoft.com/office/drawing/2010/main" val="0"/>
+              </a:ext>
+            </a:extLst>
+          </a:blip>
+          <a:stretch>
+            <a:fillRect/>
+          </a:stretch>
+        </p:blipFill>
+        <p:spPr>
+          <a:xfrm>
+            <a:off x="22695967" y="13190183"/>
+            <a:ext cx="10104288" cy="5052145"/>
+          </a:xfrm>
+          <a:prstGeom prst="rect">
+            <a:avLst/>
+          </a:prstGeom>
+        </p:spPr>
+      </p:pic>
     </p:spTree>
   </p:cSld>
   <p:clrMapOvr>

</xml_diff>